<commit_message>
2/12 pre-exam slides; corrected so words shown as 32 bits
</commit_message>
<xml_diff>
--- a/cs447jb_rec4_feb12.pptx
+++ b/cs447jb_rec4_feb12.pptx
@@ -242,7 +242,7 @@
           <a:p>
             <a:fld id="{79DACF82-7282-4538-9925-81D795D18BF0}" type="datetimeFigureOut">
               <a:rPr lang="en-US" smtClean="0"/>
-              <a:t>2/11/2018</a:t>
+              <a:t>2/12/2018</a:t>
             </a:fld>
             <a:endParaRPr lang="en-US"/>
           </a:p>
@@ -1732,7 +1732,7 @@
           <a:p>
             <a:fld id="{7880F47B-3C72-48E5-9CD2-8B9AE0E9AFF7}" type="datetimeFigureOut">
               <a:rPr lang="en-US" smtClean="0"/>
-              <a:t>2/11/2018</a:t>
+              <a:t>2/12/2018</a:t>
             </a:fld>
             <a:endParaRPr lang="en-US"/>
           </a:p>
@@ -1902,7 +1902,7 @@
           <a:p>
             <a:fld id="{7880F47B-3C72-48E5-9CD2-8B9AE0E9AFF7}" type="datetimeFigureOut">
               <a:rPr lang="en-US" smtClean="0"/>
-              <a:t>2/11/2018</a:t>
+              <a:t>2/12/2018</a:t>
             </a:fld>
             <a:endParaRPr lang="en-US"/>
           </a:p>
@@ -2082,7 +2082,7 @@
           <a:p>
             <a:fld id="{7880F47B-3C72-48E5-9CD2-8B9AE0E9AFF7}" type="datetimeFigureOut">
               <a:rPr lang="en-US" smtClean="0"/>
-              <a:t>2/11/2018</a:t>
+              <a:t>2/12/2018</a:t>
             </a:fld>
             <a:endParaRPr lang="en-US"/>
           </a:p>
@@ -2252,7 +2252,7 @@
           <a:p>
             <a:fld id="{7880F47B-3C72-48E5-9CD2-8B9AE0E9AFF7}" type="datetimeFigureOut">
               <a:rPr lang="en-US" smtClean="0"/>
-              <a:t>2/11/2018</a:t>
+              <a:t>2/12/2018</a:t>
             </a:fld>
             <a:endParaRPr lang="en-US"/>
           </a:p>
@@ -2496,7 +2496,7 @@
           <a:p>
             <a:fld id="{7880F47B-3C72-48E5-9CD2-8B9AE0E9AFF7}" type="datetimeFigureOut">
               <a:rPr lang="en-US" smtClean="0"/>
-              <a:t>2/11/2018</a:t>
+              <a:t>2/12/2018</a:t>
             </a:fld>
             <a:endParaRPr lang="en-US"/>
           </a:p>
@@ -2728,7 +2728,7 @@
           <a:p>
             <a:fld id="{7880F47B-3C72-48E5-9CD2-8B9AE0E9AFF7}" type="datetimeFigureOut">
               <a:rPr lang="en-US" smtClean="0"/>
-              <a:t>2/11/2018</a:t>
+              <a:t>2/12/2018</a:t>
             </a:fld>
             <a:endParaRPr lang="en-US"/>
           </a:p>
@@ -3095,7 +3095,7 @@
           <a:p>
             <a:fld id="{7880F47B-3C72-48E5-9CD2-8B9AE0E9AFF7}" type="datetimeFigureOut">
               <a:rPr lang="en-US" smtClean="0"/>
-              <a:t>2/11/2018</a:t>
+              <a:t>2/12/2018</a:t>
             </a:fld>
             <a:endParaRPr lang="en-US"/>
           </a:p>
@@ -3213,7 +3213,7 @@
           <a:p>
             <a:fld id="{7880F47B-3C72-48E5-9CD2-8B9AE0E9AFF7}" type="datetimeFigureOut">
               <a:rPr lang="en-US" smtClean="0"/>
-              <a:t>2/11/2018</a:t>
+              <a:t>2/12/2018</a:t>
             </a:fld>
             <a:endParaRPr lang="en-US"/>
           </a:p>
@@ -3308,7 +3308,7 @@
           <a:p>
             <a:fld id="{7880F47B-3C72-48E5-9CD2-8B9AE0E9AFF7}" type="datetimeFigureOut">
               <a:rPr lang="en-US" smtClean="0"/>
-              <a:t>2/11/2018</a:t>
+              <a:t>2/12/2018</a:t>
             </a:fld>
             <a:endParaRPr lang="en-US"/>
           </a:p>
@@ -3585,7 +3585,7 @@
           <a:p>
             <a:fld id="{7880F47B-3C72-48E5-9CD2-8B9AE0E9AFF7}" type="datetimeFigureOut">
               <a:rPr lang="en-US" smtClean="0"/>
-              <a:t>2/11/2018</a:t>
+              <a:t>2/12/2018</a:t>
             </a:fld>
             <a:endParaRPr lang="en-US"/>
           </a:p>
@@ -3842,7 +3842,7 @@
           <a:p>
             <a:fld id="{7880F47B-3C72-48E5-9CD2-8B9AE0E9AFF7}" type="datetimeFigureOut">
               <a:rPr lang="en-US" smtClean="0"/>
-              <a:t>2/11/2018</a:t>
+              <a:t>2/12/2018</a:t>
             </a:fld>
             <a:endParaRPr lang="en-US"/>
           </a:p>
@@ -4055,7 +4055,7 @@
           <a:p>
             <a:fld id="{7880F47B-3C72-48E5-9CD2-8B9AE0E9AFF7}" type="datetimeFigureOut">
               <a:rPr lang="en-US" smtClean="0"/>
-              <a:t>2/11/2018</a:t>
+              <a:t>2/12/2018</a:t>
             </a:fld>
             <a:endParaRPr lang="en-US"/>
           </a:p>
@@ -5540,7 +5540,7 @@
             </a:r>
             <a:r>
               <a:rPr lang="en-US" dirty="0"/>
-              <a:t>.  The word-length representation is 0000000011111111</a:t>
+              <a:t>.  The word-length representation is 00000000000000000000000011111111</a:t>
             </a:r>
             <a:r>
               <a:rPr lang="en-US" baseline="-25000" dirty="0"/>
@@ -5744,57 +5744,6 @@
           </a:fontRef>
         </p:style>
       </p:cxnSp>
-      <p:sp>
-        <p:nvSpPr>
-          <p:cNvPr id="7" name="TextBox 6">
-            <a:extLst>
-              <a:ext uri="{FF2B5EF4-FFF2-40B4-BE49-F238E27FC236}">
-                <a16:creationId xmlns:a16="http://schemas.microsoft.com/office/drawing/2014/main" id="{C26B3632-1AA6-483A-B59D-833F4D619200}"/>
-              </a:ext>
-            </a:extLst>
-          </p:cNvPr>
-          <p:cNvSpPr txBox="1"/>
-          <p:nvPr/>
-        </p:nvSpPr>
-        <p:spPr>
-          <a:xfrm>
-            <a:off x="3949013" y="2342520"/>
-            <a:ext cx="4065373" cy="923330"/>
-          </a:xfrm>
-          <a:prstGeom prst="rect">
-            <a:avLst/>
-          </a:prstGeom>
-          <a:noFill/>
-        </p:spPr>
-        <p:txBody>
-          <a:bodyPr wrap="square" rtlCol="0">
-            <a:spAutoFit/>
-          </a:bodyPr>
-          <a:lstStyle/>
-          <a:p>
-            <a:r>
-              <a:rPr lang="en-US" dirty="0"/>
-              <a:t>Byte-length representation is 11111111</a:t>
-            </a:r>
-            <a:r>
-              <a:rPr lang="en-US" baseline="-25000" dirty="0"/>
-              <a:t>2</a:t>
-            </a:r>
-            <a:r>
-              <a:rPr lang="en-US" dirty="0"/>
-              <a:t>.  The word-length representation is 0000000011111111</a:t>
-            </a:r>
-            <a:r>
-              <a:rPr lang="en-US" baseline="-25000" dirty="0"/>
-              <a:t>2</a:t>
-            </a:r>
-            <a:r>
-              <a:rPr lang="en-US" dirty="0"/>
-              <a:t>. </a:t>
-            </a:r>
-          </a:p>
-        </p:txBody>
-      </p:sp>
       <p:cxnSp>
         <p:nvCxnSpPr>
           <p:cNvPr id="8" name="Straight Arrow Connector 7">
@@ -5850,8 +5799,8 @@
         </p:nvSpPr>
         <p:spPr>
           <a:xfrm>
-            <a:off x="3969607" y="3429000"/>
-            <a:ext cx="3249827" cy="923330"/>
+            <a:off x="3969607" y="3525102"/>
+            <a:ext cx="4951970" cy="923330"/>
           </a:xfrm>
           <a:prstGeom prst="rect">
             <a:avLst/>
@@ -5878,7 +5827,7 @@
             </a:r>
             <a:r>
               <a:rPr lang="en-US" dirty="0"/>
-              <a:t>, such that t1 = 1111111111111111</a:t>
+              <a:t>, such that t1 = 11111111111111111111111111111111</a:t>
             </a:r>
             <a:r>
               <a:rPr lang="en-US" baseline="-25000" dirty="0"/>
@@ -5895,6 +5844,57 @@
                 </a:solidFill>
               </a:rPr>
               <a:t>-1</a:t>
+            </a:r>
+          </a:p>
+        </p:txBody>
+      </p:sp>
+      <p:sp>
+        <p:nvSpPr>
+          <p:cNvPr id="10" name="TextBox 9">
+            <a:extLst>
+              <a:ext uri="{FF2B5EF4-FFF2-40B4-BE49-F238E27FC236}">
+                <a16:creationId xmlns:a16="http://schemas.microsoft.com/office/drawing/2014/main" id="{CDA8BBE7-0180-461E-94D4-4B045551B789}"/>
+              </a:ext>
+            </a:extLst>
+          </p:cNvPr>
+          <p:cNvSpPr txBox="1"/>
+          <p:nvPr/>
+        </p:nvSpPr>
+        <p:spPr>
+          <a:xfrm>
+            <a:off x="3949013" y="2438622"/>
+            <a:ext cx="4065373" cy="923330"/>
+          </a:xfrm>
+          <a:prstGeom prst="rect">
+            <a:avLst/>
+          </a:prstGeom>
+          <a:noFill/>
+        </p:spPr>
+        <p:txBody>
+          <a:bodyPr wrap="square" rtlCol="0">
+            <a:spAutoFit/>
+          </a:bodyPr>
+          <a:lstStyle/>
+          <a:p>
+            <a:r>
+              <a:rPr lang="en-US" dirty="0"/>
+              <a:t>Byte-length representation is 11111111</a:t>
+            </a:r>
+            <a:r>
+              <a:rPr lang="en-US" baseline="-25000" dirty="0"/>
+              <a:t>2</a:t>
+            </a:r>
+            <a:r>
+              <a:rPr lang="en-US" dirty="0"/>
+              <a:t>.  The word-length representation is 00000000000000000000000011111111</a:t>
+            </a:r>
+            <a:r>
+              <a:rPr lang="en-US" baseline="-25000" dirty="0"/>
+              <a:t>2</a:t>
+            </a:r>
+            <a:r>
+              <a:rPr lang="en-US" dirty="0"/>
+              <a:t>. </a:t>
             </a:r>
           </a:p>
         </p:txBody>
@@ -6090,57 +6090,6 @@
           </a:fontRef>
         </p:style>
       </p:cxnSp>
-      <p:sp>
-        <p:nvSpPr>
-          <p:cNvPr id="7" name="TextBox 6">
-            <a:extLst>
-              <a:ext uri="{FF2B5EF4-FFF2-40B4-BE49-F238E27FC236}">
-                <a16:creationId xmlns:a16="http://schemas.microsoft.com/office/drawing/2014/main" id="{C26B3632-1AA6-483A-B59D-833F4D619200}"/>
-              </a:ext>
-            </a:extLst>
-          </p:cNvPr>
-          <p:cNvSpPr txBox="1"/>
-          <p:nvPr/>
-        </p:nvSpPr>
-        <p:spPr>
-          <a:xfrm>
-            <a:off x="3949013" y="2342520"/>
-            <a:ext cx="4065373" cy="923330"/>
-          </a:xfrm>
-          <a:prstGeom prst="rect">
-            <a:avLst/>
-          </a:prstGeom>
-          <a:noFill/>
-        </p:spPr>
-        <p:txBody>
-          <a:bodyPr wrap="square" rtlCol="0">
-            <a:spAutoFit/>
-          </a:bodyPr>
-          <a:lstStyle/>
-          <a:p>
-            <a:r>
-              <a:rPr lang="en-US" dirty="0"/>
-              <a:t>Byte-length representation is 11111111</a:t>
-            </a:r>
-            <a:r>
-              <a:rPr lang="en-US" baseline="-25000" dirty="0"/>
-              <a:t>2</a:t>
-            </a:r>
-            <a:r>
-              <a:rPr lang="en-US" dirty="0"/>
-              <a:t>.  The word-length representation is 0000000011111111</a:t>
-            </a:r>
-            <a:r>
-              <a:rPr lang="en-US" baseline="-25000" dirty="0"/>
-              <a:t>2</a:t>
-            </a:r>
-            <a:r>
-              <a:rPr lang="en-US" dirty="0"/>
-              <a:t>. </a:t>
-            </a:r>
-          </a:p>
-        </p:txBody>
-      </p:sp>
       <p:cxnSp>
         <p:nvCxnSpPr>
           <p:cNvPr id="8" name="Straight Arrow Connector 7">
@@ -6182,69 +6131,6 @@
           </a:fontRef>
         </p:style>
       </p:cxnSp>
-      <p:sp>
-        <p:nvSpPr>
-          <p:cNvPr id="9" name="TextBox 8">
-            <a:extLst>
-              <a:ext uri="{FF2B5EF4-FFF2-40B4-BE49-F238E27FC236}">
-                <a16:creationId xmlns:a16="http://schemas.microsoft.com/office/drawing/2014/main" id="{D635769A-AACC-40FF-8D74-F8D23081F8B5}"/>
-              </a:ext>
-            </a:extLst>
-          </p:cNvPr>
-          <p:cNvSpPr txBox="1"/>
-          <p:nvPr/>
-        </p:nvSpPr>
-        <p:spPr>
-          <a:xfrm>
-            <a:off x="3969607" y="3429000"/>
-            <a:ext cx="3249827" cy="923330"/>
-          </a:xfrm>
-          <a:prstGeom prst="rect">
-            <a:avLst/>
-          </a:prstGeom>
-          <a:noFill/>
-        </p:spPr>
-        <p:txBody>
-          <a:bodyPr wrap="square" rtlCol="0">
-            <a:spAutoFit/>
-          </a:bodyPr>
-          <a:lstStyle/>
-          <a:p>
-            <a:r>
-              <a:rPr lang="en-US" dirty="0" err="1"/>
-              <a:t>lb</a:t>
-            </a:r>
-            <a:r>
-              <a:rPr lang="en-US" dirty="0"/>
-              <a:t> will perform sign extension on 11111111</a:t>
-            </a:r>
-            <a:r>
-              <a:rPr lang="en-US" baseline="-25000" dirty="0"/>
-              <a:t>2</a:t>
-            </a:r>
-            <a:r>
-              <a:rPr lang="en-US" dirty="0"/>
-              <a:t>, such that t1 = 1111111111111111</a:t>
-            </a:r>
-            <a:r>
-              <a:rPr lang="en-US" baseline="-25000" dirty="0"/>
-              <a:t>2</a:t>
-            </a:r>
-            <a:r>
-              <a:rPr lang="en-US" dirty="0"/>
-              <a:t> = </a:t>
-            </a:r>
-            <a:r>
-              <a:rPr lang="en-US" dirty="0">
-                <a:solidFill>
-                  <a:srgbClr val="FF0000"/>
-                </a:solidFill>
-              </a:rPr>
-              <a:t>-1</a:t>
-            </a:r>
-          </a:p>
-        </p:txBody>
-      </p:sp>
       <p:cxnSp>
         <p:nvCxnSpPr>
           <p:cNvPr id="10" name="Straight Arrow Connector 9">
@@ -6301,7 +6187,7 @@
         <p:spPr>
           <a:xfrm>
             <a:off x="4253811" y="4898876"/>
-            <a:ext cx="3249827" cy="1200329"/>
+            <a:ext cx="4178989" cy="1200329"/>
           </a:xfrm>
           <a:prstGeom prst="rect">
             <a:avLst/>
@@ -6336,7 +6222,7 @@
             </a:r>
             <a:r>
               <a:rPr lang="en-US" dirty="0"/>
-              <a:t> value, resulting in 0000000011111111</a:t>
+              <a:t> value, resulting in 00000000000000000000000011111111</a:t>
             </a:r>
             <a:r>
               <a:rPr lang="en-US" baseline="-25000" dirty="0"/>
@@ -6351,6 +6237,120 @@
                 <a:srgbClr val="FF0000"/>
               </a:solidFill>
             </a:endParaRPr>
+          </a:p>
+        </p:txBody>
+      </p:sp>
+      <p:sp>
+        <p:nvSpPr>
+          <p:cNvPr id="13" name="TextBox 12">
+            <a:extLst>
+              <a:ext uri="{FF2B5EF4-FFF2-40B4-BE49-F238E27FC236}">
+                <a16:creationId xmlns:a16="http://schemas.microsoft.com/office/drawing/2014/main" id="{E5BA68CC-5637-4C74-AD33-6F45125FD215}"/>
+              </a:ext>
+            </a:extLst>
+          </p:cNvPr>
+          <p:cNvSpPr txBox="1"/>
+          <p:nvPr/>
+        </p:nvSpPr>
+        <p:spPr>
+          <a:xfrm>
+            <a:off x="3969607" y="3525102"/>
+            <a:ext cx="4951970" cy="923330"/>
+          </a:xfrm>
+          <a:prstGeom prst="rect">
+            <a:avLst/>
+          </a:prstGeom>
+          <a:noFill/>
+        </p:spPr>
+        <p:txBody>
+          <a:bodyPr wrap="square" rtlCol="0">
+            <a:spAutoFit/>
+          </a:bodyPr>
+          <a:lstStyle/>
+          <a:p>
+            <a:r>
+              <a:rPr lang="en-US" dirty="0" err="1"/>
+              <a:t>lb</a:t>
+            </a:r>
+            <a:r>
+              <a:rPr lang="en-US" dirty="0"/>
+              <a:t> will perform sign extension on 11111111</a:t>
+            </a:r>
+            <a:r>
+              <a:rPr lang="en-US" baseline="-25000" dirty="0"/>
+              <a:t>2</a:t>
+            </a:r>
+            <a:r>
+              <a:rPr lang="en-US" dirty="0"/>
+              <a:t>, such that t1 = 11111111111111111111111111111111</a:t>
+            </a:r>
+            <a:r>
+              <a:rPr lang="en-US" baseline="-25000" dirty="0"/>
+              <a:t>2</a:t>
+            </a:r>
+            <a:r>
+              <a:rPr lang="en-US" dirty="0"/>
+              <a:t> = </a:t>
+            </a:r>
+            <a:r>
+              <a:rPr lang="en-US" dirty="0">
+                <a:solidFill>
+                  <a:srgbClr val="FF0000"/>
+                </a:solidFill>
+              </a:rPr>
+              <a:t>-1</a:t>
+            </a:r>
+          </a:p>
+        </p:txBody>
+      </p:sp>
+      <p:sp>
+        <p:nvSpPr>
+          <p:cNvPr id="14" name="TextBox 13">
+            <a:extLst>
+              <a:ext uri="{FF2B5EF4-FFF2-40B4-BE49-F238E27FC236}">
+                <a16:creationId xmlns:a16="http://schemas.microsoft.com/office/drawing/2014/main" id="{7872F8AA-909B-49B2-AE9A-BA229BC3E32E}"/>
+              </a:ext>
+            </a:extLst>
+          </p:cNvPr>
+          <p:cNvSpPr txBox="1"/>
+          <p:nvPr/>
+        </p:nvSpPr>
+        <p:spPr>
+          <a:xfrm>
+            <a:off x="3949013" y="2438622"/>
+            <a:ext cx="4065373" cy="923330"/>
+          </a:xfrm>
+          <a:prstGeom prst="rect">
+            <a:avLst/>
+          </a:prstGeom>
+          <a:noFill/>
+        </p:spPr>
+        <p:txBody>
+          <a:bodyPr wrap="square" rtlCol="0">
+            <a:spAutoFit/>
+          </a:bodyPr>
+          <a:lstStyle/>
+          <a:p>
+            <a:r>
+              <a:rPr lang="en-US" dirty="0"/>
+              <a:t>Byte-length representation is 11111111</a:t>
+            </a:r>
+            <a:r>
+              <a:rPr lang="en-US" baseline="-25000" dirty="0"/>
+              <a:t>2</a:t>
+            </a:r>
+            <a:r>
+              <a:rPr lang="en-US" dirty="0"/>
+              <a:t>.  The word-length representation is 00000000000000000000000011111111</a:t>
+            </a:r>
+            <a:r>
+              <a:rPr lang="en-US" baseline="-25000" dirty="0"/>
+              <a:t>2</a:t>
+            </a:r>
+            <a:r>
+              <a:rPr lang="en-US" dirty="0"/>
+              <a:t>. </a:t>
+            </a:r>
           </a:p>
         </p:txBody>
       </p:sp>

</xml_diff>